<commit_message>
Changed 'Executing Chunks - In Console' Slide
Changed the picture in the slide to show the method using Tools-Global Options-R Markdown to edit the settings. Adjust the text to the left to reflect this change.
</commit_message>
<xml_diff>
--- a/Using R Notebook with Version Control.pptx
+++ b/Using R Notebook with Version Control.pptx
@@ -462,7 +462,7 @@
             <a:fld id="{B61BEF0D-F0BB-DE4B-95CE-6DB70DBA9567}" type="datetimeFigureOut">
               <a:rPr lang="en-US" dirty="0"/>
               <a:pPr/>
-              <a:t>10/24/2018</a:t>
+              <a:t>12/1/2018</a:t>
             </a:fld>
             <a:endParaRPr lang="en-US" dirty="0"/>
           </a:p>
@@ -783,7 +783,7 @@
             <a:fld id="{B61BEF0D-F0BB-DE4B-95CE-6DB70DBA9567}" type="datetimeFigureOut">
               <a:rPr lang="en-US" dirty="0"/>
               <a:pPr/>
-              <a:t>10/24/2018</a:t>
+              <a:t>12/1/2018</a:t>
             </a:fld>
             <a:endParaRPr lang="en-US" dirty="0"/>
           </a:p>
@@ -1028,7 +1028,7 @@
             <a:fld id="{B61BEF0D-F0BB-DE4B-95CE-6DB70DBA9567}" type="datetimeFigureOut">
               <a:rPr lang="en-US" dirty="0"/>
               <a:pPr/>
-              <a:t>10/24/2018</a:t>
+              <a:t>12/1/2018</a:t>
             </a:fld>
             <a:endParaRPr lang="en-US" dirty="0"/>
           </a:p>
@@ -1364,7 +1364,7 @@
             <a:fld id="{B61BEF0D-F0BB-DE4B-95CE-6DB70DBA9567}" type="datetimeFigureOut">
               <a:rPr lang="en-US" dirty="0"/>
               <a:pPr/>
-              <a:t>10/24/2018</a:t>
+              <a:t>12/1/2018</a:t>
             </a:fld>
             <a:endParaRPr lang="en-US" dirty="0"/>
           </a:p>
@@ -1708,7 +1708,7 @@
             <a:fld id="{B61BEF0D-F0BB-DE4B-95CE-6DB70DBA9567}" type="datetimeFigureOut">
               <a:rPr lang="en-US" dirty="0"/>
               <a:pPr/>
-              <a:t>10/24/2018</a:t>
+              <a:t>12/1/2018</a:t>
             </a:fld>
             <a:endParaRPr lang="en-US" dirty="0"/>
           </a:p>
@@ -2079,7 +2079,7 @@
             <a:fld id="{B61BEF0D-F0BB-DE4B-95CE-6DB70DBA9567}" type="datetimeFigureOut">
               <a:rPr lang="en-US" dirty="0"/>
               <a:pPr/>
-              <a:t>10/24/2018</a:t>
+              <a:t>12/1/2018</a:t>
             </a:fld>
             <a:endParaRPr lang="en-US" dirty="0"/>
           </a:p>
@@ -2546,7 +2546,7 @@
             <a:fld id="{B61BEF0D-F0BB-DE4B-95CE-6DB70DBA9567}" type="datetimeFigureOut">
               <a:rPr lang="en-US" dirty="0"/>
               <a:pPr/>
-              <a:t>10/24/2018</a:t>
+              <a:t>12/1/2018</a:t>
             </a:fld>
             <a:endParaRPr lang="en-US" dirty="0"/>
           </a:p>
@@ -2748,7 +2748,7 @@
             <a:fld id="{B61BEF0D-F0BB-DE4B-95CE-6DB70DBA9567}" type="datetimeFigureOut">
               <a:rPr lang="en-US" dirty="0"/>
               <a:pPr/>
-              <a:t>10/24/2018</a:t>
+              <a:t>12/1/2018</a:t>
             </a:fld>
             <a:endParaRPr lang="en-US" dirty="0"/>
           </a:p>
@@ -2956,7 +2956,7 @@
             <a:fld id="{B61BEF0D-F0BB-DE4B-95CE-6DB70DBA9567}" type="datetimeFigureOut">
               <a:rPr lang="en-US" dirty="0"/>
               <a:pPr/>
-              <a:t>10/24/2018</a:t>
+              <a:t>12/1/2018</a:t>
             </a:fld>
             <a:endParaRPr lang="en-US" dirty="0"/>
           </a:p>
@@ -3184,7 +3184,7 @@
           <a:p>
             <a:fld id="{52647F38-B617-4D2F-AE0A-013F0C4D2C57}" type="datetimeFigureOut">
               <a:rPr lang="en-US" dirty="0"/>
-              <a:t>10/24/2018</a:t>
+              <a:t>12/1/2018</a:t>
             </a:fld>
             <a:endParaRPr lang="en-US" dirty="0"/>
           </a:p>
@@ -3428,7 +3428,7 @@
             <a:fld id="{B61BEF0D-F0BB-DE4B-95CE-6DB70DBA9567}" type="datetimeFigureOut">
               <a:rPr lang="en-US" dirty="0"/>
               <a:pPr/>
-              <a:t>10/24/2018</a:t>
+              <a:t>12/1/2018</a:t>
             </a:fld>
             <a:endParaRPr lang="en-US" dirty="0"/>
           </a:p>
@@ -3722,7 +3722,7 @@
           <a:p>
             <a:fld id="{05BFA754-D5C3-4E66-96A6-867B257F58DC}" type="datetimeFigureOut">
               <a:rPr lang="en-US" dirty="0"/>
-              <a:t>10/24/2018</a:t>
+              <a:t>12/1/2018</a:t>
             </a:fld>
             <a:endParaRPr lang="en-US" dirty="0"/>
           </a:p>
@@ -4112,7 +4112,7 @@
             <a:fld id="{B61BEF0D-F0BB-DE4B-95CE-6DB70DBA9567}" type="datetimeFigureOut">
               <a:rPr lang="en-US" dirty="0"/>
               <a:pPr/>
-              <a:t>10/24/2018</a:t>
+              <a:t>12/1/2018</a:t>
             </a:fld>
             <a:endParaRPr lang="en-US" dirty="0"/>
           </a:p>
@@ -4258,7 +4258,7 @@
             <a:fld id="{B61BEF0D-F0BB-DE4B-95CE-6DB70DBA9567}" type="datetimeFigureOut">
               <a:rPr lang="en-US" dirty="0"/>
               <a:pPr/>
-              <a:t>10/24/2018</a:t>
+              <a:t>12/1/2018</a:t>
             </a:fld>
             <a:endParaRPr lang="en-US" dirty="0"/>
           </a:p>
@@ -4381,7 +4381,7 @@
             <a:fld id="{B61BEF0D-F0BB-DE4B-95CE-6DB70DBA9567}" type="datetimeFigureOut">
               <a:rPr lang="en-US" dirty="0"/>
               <a:pPr/>
-              <a:t>10/24/2018</a:t>
+              <a:t>12/1/2018</a:t>
             </a:fld>
             <a:endParaRPr lang="en-US" dirty="0"/>
           </a:p>
@@ -4633,7 +4633,7 @@
             <a:fld id="{B61BEF0D-F0BB-DE4B-95CE-6DB70DBA9567}" type="datetimeFigureOut">
               <a:rPr lang="en-US" dirty="0"/>
               <a:pPr/>
-              <a:t>10/24/2018</a:t>
+              <a:t>12/1/2018</a:t>
             </a:fld>
             <a:endParaRPr lang="en-US" dirty="0"/>
           </a:p>
@@ -4945,7 +4945,7 @@
             <a:fld id="{B61BEF0D-F0BB-DE4B-95CE-6DB70DBA9567}" type="datetimeFigureOut">
               <a:rPr lang="en-US" dirty="0"/>
               <a:pPr/>
-              <a:t>10/24/2018</a:t>
+              <a:t>12/1/2018</a:t>
             </a:fld>
             <a:endParaRPr lang="en-US" dirty="0"/>
           </a:p>
@@ -5293,7 +5293,7 @@
             <a:fld id="{B61BEF0D-F0BB-DE4B-95CE-6DB70DBA9567}" type="datetimeFigureOut">
               <a:rPr lang="en-US" dirty="0"/>
               <a:pPr/>
-              <a:t>10/24/2018</a:t>
+              <a:t>12/1/2018</a:t>
             </a:fld>
             <a:endParaRPr lang="en-US" dirty="0"/>
           </a:p>
@@ -12083,7 +12083,6 @@
               <a:rPr lang="en-US" dirty="0" smtClean="0"/>
               <a:t> </a:t>
             </a:r>
-            <a:endParaRPr lang="en-US" dirty="0" smtClean="0"/>
           </a:p>
           <a:p>
             <a:r>
@@ -14178,11 +14177,7 @@
             </a:pPr>
             <a:r>
               <a:rPr lang="en-US" sz="1900" b="1" dirty="0" smtClean="0"/>
-              <a:t>Answer</a:t>
-            </a:r>
-            <a:r>
-              <a:rPr lang="en-US" sz="1900" b="1" dirty="0" smtClean="0"/>
-              <a:t>: </a:t>
+              <a:t>Answer: </a:t>
             </a:r>
             <a:r>
               <a:rPr lang="en-US" sz="1900" dirty="0" smtClean="0"/>
@@ -14194,11 +14189,7 @@
             </a:r>
             <a:r>
               <a:rPr lang="en-US" sz="1900" dirty="0" smtClean="0"/>
-              <a:t>. The exception to this is altering the working </a:t>
-            </a:r>
-            <a:r>
-              <a:rPr lang="en-US" sz="1900" dirty="0" smtClean="0"/>
-              <a:t>directory.</a:t>
+              <a:t>. The exception to this is altering the working directory.</a:t>
             </a:r>
           </a:p>
           <a:p>
@@ -14208,15 +14199,7 @@
             </a:pPr>
             <a:r>
               <a:rPr lang="en-US" sz="1500" dirty="0" smtClean="0"/>
-              <a:t>By default, R </a:t>
-            </a:r>
-            <a:r>
-              <a:rPr lang="en-US" sz="1500" dirty="0" smtClean="0"/>
-              <a:t>doesn’t </a:t>
-            </a:r>
-            <a:r>
-              <a:rPr lang="en-US" sz="1500" dirty="0" smtClean="0"/>
-              <a:t>want an R Notebook chunk messing with things outside of the file itself</a:t>
+              <a:t>By default, R doesn’t want an R Notebook chunk messing with things outside of the file itself</a:t>
             </a:r>
           </a:p>
           <a:p>
@@ -14226,15 +14209,7 @@
             </a:pPr>
             <a:r>
               <a:rPr lang="en-US" sz="1500" dirty="0" smtClean="0"/>
-              <a:t>Thus, R doesn’t permit </a:t>
-            </a:r>
-            <a:r>
-              <a:rPr lang="en-US" sz="1500" dirty="0" smtClean="0"/>
-              <a:t>chunk assignments to change the working directory any further than the end of the </a:t>
-            </a:r>
-            <a:r>
-              <a:rPr lang="en-US" sz="1500" dirty="0" smtClean="0"/>
-              <a:t>chunk</a:t>
+              <a:t>Thus, R doesn’t permit chunk assignments to change the working directory any further than the end of the chunk</a:t>
             </a:r>
           </a:p>
           <a:p>
@@ -14244,19 +14219,7 @@
             </a:pPr>
             <a:r>
               <a:rPr lang="en-US" sz="1500" dirty="0" smtClean="0"/>
-              <a:t>This </a:t>
-            </a:r>
-            <a:r>
-              <a:rPr lang="en-US" sz="1500" dirty="0" smtClean="0"/>
-              <a:t>can be bypassed however by </a:t>
-            </a:r>
-            <a:r>
-              <a:rPr lang="en-US" sz="1500" dirty="0" smtClean="0"/>
-              <a:t>replacing{r</a:t>
-            </a:r>
-            <a:r>
-              <a:rPr lang="en-US" sz="1500" dirty="0" smtClean="0"/>
-              <a:t>} with {r setup</a:t>
+              <a:t>This can be bypassed however by replacing{r} with {r setup</a:t>
             </a:r>
             <a:r>
               <a:rPr lang="en-US" sz="1500" dirty="0"/>
@@ -14264,15 +14227,7 @@
             </a:r>
             <a:r>
               <a:rPr lang="en-US" sz="1500" dirty="0" smtClean="0"/>
-              <a:t>and then </a:t>
-            </a:r>
-            <a:r>
-              <a:rPr lang="en-US" sz="1500" dirty="0" smtClean="0"/>
-              <a:t>executing the </a:t>
-            </a:r>
-            <a:r>
-              <a:rPr lang="en-US" sz="1500" dirty="0" smtClean="0"/>
-              <a:t>“</a:t>
+              <a:t>and then executing the “</a:t>
             </a:r>
             <a:r>
               <a:rPr lang="en-US" sz="1500" dirty="0" err="1" smtClean="0"/>
@@ -14288,15 +14243,7 @@
             </a:r>
             <a:r>
               <a:rPr lang="en-US" sz="1500" dirty="0" smtClean="0"/>
-              <a:t>…” code </a:t>
-            </a:r>
-            <a:r>
-              <a:rPr lang="en-US" sz="1500" dirty="0" smtClean="0"/>
-              <a:t>previously shown</a:t>
-            </a:r>
-            <a:r>
-              <a:rPr lang="en-US" sz="1500" dirty="0" smtClean="0"/>
-              <a:t>. </a:t>
+              <a:t>…” code previously shown. </a:t>
             </a:r>
           </a:p>
           <a:p>
@@ -14306,15 +14253,7 @@
             </a:pPr>
             <a:r>
               <a:rPr lang="en-US" sz="1500" dirty="0" smtClean="0"/>
-              <a:t>While </a:t>
-            </a:r>
-            <a:r>
-              <a:rPr lang="en-US" sz="1500" dirty="0" smtClean="0"/>
-              <a:t>normal R Notebook files are presumed to be self-contained, the </a:t>
-            </a:r>
-            <a:r>
-              <a:rPr lang="en-US" sz="1500" dirty="0" smtClean="0"/>
-              <a:t>special name “setup” allows outside interactions to be done</a:t>
+              <a:t>While normal R Notebook files are presumed to be self-contained, the special name “setup” allows outside interactions to be done</a:t>
             </a:r>
             <a:endParaRPr lang="en-US" sz="1500" dirty="0"/>
           </a:p>
@@ -14397,7 +14336,7 @@
         <p:spPr/>
         <p:txBody>
           <a:bodyPr>
-            <a:normAutofit/>
+            <a:normAutofit fontScale="92500" lnSpcReduction="10000"/>
           </a:bodyPr>
           <a:lstStyle/>
           <a:p>
@@ -14409,7 +14348,19 @@
           <a:p>
             <a:r>
               <a:rPr lang="en-US" sz="2800" dirty="0" smtClean="0"/>
-              <a:t>To access this, click the small gear icon, 	    , and select “Chunk Output in Console” within the third box</a:t>
+              <a:t>To access this, </a:t>
+            </a:r>
+            <a:r>
+              <a:rPr lang="en-US" sz="2800" dirty="0" smtClean="0"/>
+              <a:t>click Tools -&gt; Global Options, then select ‘R Markdown’ 6</a:t>
+            </a:r>
+            <a:r>
+              <a:rPr lang="en-US" sz="2800" baseline="30000" dirty="0" smtClean="0"/>
+              <a:t>th</a:t>
+            </a:r>
+            <a:r>
+              <a:rPr lang="en-US" sz="2800" dirty="0" smtClean="0"/>
+              <a:t> down from the left and uncheck the indicated option displayed to the right</a:t>
             </a:r>
             <a:endParaRPr lang="en-US" sz="2800" dirty="0"/>
           </a:p>
@@ -14417,66 +14368,30 @@
       </p:sp>
       <p:pic>
         <p:nvPicPr>
-          <p:cNvPr id="7" name="Picture 6"/>
-          <p:cNvPicPr/>
-          <p:nvPr/>
-        </p:nvPicPr>
-        <p:blipFill rotWithShape="1">
-          <a:blip r:embed="rId2"/>
-          <a:srcRect l="16770" t="11130" r="81877" b="86787"/>
-          <a:stretch/>
-        </p:blipFill>
-        <p:spPr bwMode="auto">
-          <a:xfrm>
-            <a:off x="3010260" y="4448297"/>
-            <a:ext cx="569702" cy="451507"/>
-          </a:xfrm>
-          <a:prstGeom prst="rect">
-            <a:avLst/>
-          </a:prstGeom>
-          <a:ln>
-            <a:noFill/>
-          </a:ln>
-          <a:extLst>
-            <a:ext uri="{53640926-AAD7-44D8-BBD7-CCE9431645EC}">
-              <a14:shadowObscured xmlns:a14="http://schemas.microsoft.com/office/drawing/2010/main"/>
-            </a:ext>
-          </a:extLst>
-        </p:spPr>
-      </p:pic>
-      <p:pic>
-        <p:nvPicPr>
-          <p:cNvPr id="8" name="Content Placeholder 7"/>
+          <p:cNvPr id="5" name="Content Placeholder 4"/>
           <p:cNvPicPr>
-            <a:picLocks noGrp="1"/>
+            <a:picLocks noGrp="1" noChangeAspect="1"/>
           </p:cNvPicPr>
           <p:nvPr>
             <p:ph sz="half" idx="2"/>
           </p:nvPr>
         </p:nvPicPr>
         <p:blipFill rotWithShape="1">
-          <a:blip r:embed="rId3"/>
-          <a:srcRect l="3144" t="4143" r="68016" b="53741"/>
+          <a:blip r:embed="rId2">
+            <a:extLst>
+              <a:ext uri="{28A0092B-C50C-407E-A947-70E740481C1C}">
+                <a14:useLocalDpi xmlns:a14="http://schemas.microsoft.com/office/drawing/2010/main" val="0"/>
+              </a:ext>
+            </a:extLst>
+          </a:blip>
+          <a:srcRect b="20728"/>
           <a:stretch/>
         </p:blipFill>
-        <p:spPr bwMode="auto">
+        <p:spPr>
           <a:xfrm>
-            <a:off x="6526027" y="2560639"/>
-            <a:ext cx="4370571" cy="3309810"/>
+            <a:off x="6875306" y="2560638"/>
+            <a:ext cx="4201709" cy="3309810"/>
           </a:xfrm>
-          <a:prstGeom prst="rect">
-            <a:avLst/>
-          </a:prstGeom>
-          <a:ln>
-            <a:solidFill>
-              <a:schemeClr val="tx1"/>
-            </a:solidFill>
-          </a:ln>
-          <a:extLst>
-            <a:ext uri="{53640926-AAD7-44D8-BBD7-CCE9431645EC}">
-              <a14:shadowObscured xmlns:a14="http://schemas.microsoft.com/office/drawing/2010/main"/>
-            </a:ext>
-          </a:extLst>
         </p:spPr>
       </p:pic>
     </p:spTree>

</xml_diff>